<commit_message>
Updated to give the github link at the end of the slides
</commit_message>
<xml_diff>
--- a/slides/how_to_write_a_script.pptx
+++ b/slides/how_to_write_a_script.pptx
@@ -13,6 +13,7 @@
     <p:sldId id="261" r:id="rId7"/>
     <p:sldId id="262" r:id="rId8"/>
     <p:sldId id="263" r:id="rId9"/>
+    <p:sldId id="264" r:id="rId10"/>
   </p:sldIdLst>
   <p:sldSz cx="12192000" cy="6858000"/>
   <p:notesSz cx="6858000" cy="9144000"/>
@@ -5769,6 +5770,65 @@
 </p:sld>
 </file>
 
+<file path=ppt/slides/slide9.xml><?xml version="1.0" encoding="utf-8"?>
+<p:sld xmlns:a="http://schemas.openxmlformats.org/drawingml/2006/main" xmlns:r="http://schemas.openxmlformats.org/officeDocument/2006/relationships" xmlns:p="http://schemas.openxmlformats.org/presentationml/2006/main">
+  <p:cSld>
+    <p:spTree>
+      <p:nvGrpSpPr>
+        <p:cNvPr id="1" name=""/>
+        <p:cNvGrpSpPr/>
+        <p:nvPr/>
+      </p:nvGrpSpPr>
+      <p:grpSpPr>
+        <a:xfrm>
+          <a:off x="0" y="0"/>
+          <a:ext cx="0" cy="0"/>
+          <a:chOff x="0" y="0"/>
+          <a:chExt cx="0" cy="0"/>
+        </a:xfrm>
+      </p:grpSpPr>
+      <p:sp>
+        <p:nvSpPr>
+          <p:cNvPr id="3" name="Content Placeholder 2">
+            <a:extLst>
+              <a:ext uri="{FF2B5EF4-FFF2-40B4-BE49-F238E27FC236}">
+                <a16:creationId xmlns:a16="http://schemas.microsoft.com/office/drawing/2014/main" id="{DB0BEE29-071E-4ED4-B0D5-046429DF4F91}"/>
+              </a:ext>
+            </a:extLst>
+          </p:cNvPr>
+          <p:cNvSpPr>
+            <a:spLocks noGrp="1"/>
+          </p:cNvSpPr>
+          <p:nvPr>
+            <p:ph idx="1"/>
+          </p:nvPr>
+        </p:nvSpPr>
+        <p:spPr/>
+        <p:txBody>
+          <a:bodyPr/>
+          <a:lstStyle/>
+          <a:p>
+            <a:pPr lvl="0" marL="0" indent="0">
+              <a:buNone/>
+            </a:pPr>
+            <a:r>
+              <a:rPr/>
+              <a:t>Slides and markdown script is available here: </a:t>
+            </a:r>
+            <a:r>
+              <a:rPr>
+                <a:hlinkClick r:id="rId2"/>
+              </a:rPr>
+              <a:t>https://github.com/thomasbattram/how_to_write_a_script</a:t>
+            </a:r>
+          </a:p>
+        </p:txBody>
+      </p:sp>
+    </p:spTree>
+  </p:cSld>
+</p:sld>
+</file>
+
 <file path=ppt/theme/theme1.xml><?xml version="1.0" encoding="utf-8"?>
 <a:theme xmlns:a="http://schemas.openxmlformats.org/drawingml/2006/main" name="University of Bristol (Main URL)">
   <a:themeElements>

</xml_diff>

<commit_message>
added final powerpoint slides and scripts used to make screenshots
</commit_message>
<xml_diff>
--- a/slides/how_to_write_a_script.pptx
+++ b/slides/how_to_write_a_script.pptx
@@ -3938,7 +3938,7 @@
             </a:pPr>
             <a:r>
               <a:rPr/>
-              <a:t>These need different functions to read them in, some of which are only available with certain packages.</a:t>
+              <a:t>These need different functions to read them in, some of which are only available with certain packages – will be covered in more detail in the “managing data” session.</a:t>
             </a:r>
           </a:p>
         </p:txBody>
@@ -4868,6 +4868,44 @@
                 <a:hlinkClick r:id="rId3"/>
               </a:rPr>
               <a:t>https://github.com/thomasbattram/how_to_write_a_script</a:t>
+            </a:r>
+          </a:p>
+          <a:p>
+            <a:pPr lvl="0" marL="0" indent="0">
+              <a:buNone/>
+            </a:pPr>
+          </a:p>
+          <a:p>
+            <a:pPr lvl="1"/>
+            <a:r>
+              <a:rPr/>
+              <a:t>For the curious:</a:t>
+            </a:r>
+          </a:p>
+          <a:p>
+            <a:pPr lvl="2"/>
+            <a:r>
+              <a:rPr/>
+              <a:t>Rationale for github: </a:t>
+            </a:r>
+            <a:r>
+              <a:rPr>
+                <a:hlinkClick r:id="rId4"/>
+              </a:rPr>
+              <a:t>https://guides.github.com/introduction/git-handbook/</a:t>
+            </a:r>
+          </a:p>
+          <a:p>
+            <a:pPr lvl="2"/>
+            <a:r>
+              <a:rPr/>
+              <a:t>Quickstart guide: </a:t>
+            </a:r>
+            <a:r>
+              <a:rPr>
+                <a:hlinkClick r:id="rId5"/>
+              </a:rPr>
+              <a:t>https://guides.github.com/activities/hello-world/</a:t>
             </a:r>
           </a:p>
         </p:txBody>

</xml_diff>